<commit_message>
Small changes to powerpoints
</commit_message>
<xml_diff>
--- a/powerpoints/Day_10.pptx
+++ b/powerpoints/Day_10.pptx
@@ -522,7 +522,7 @@
           <a:p>
             <a:fld id="{44EAA8D1-3A60-4777-B086-712A7C44836F}" type="datetimeFigureOut">
               <a:rPr lang="en-US" smtClean="0"/>
-              <a:t>9/15/2021</a:t>
+              <a:t>9/16/2021</a:t>
             </a:fld>
             <a:endParaRPr lang="en-US"/>
           </a:p>
@@ -42018,8 +42018,8 @@
           </a:p>
         </p:txBody>
       </p:sp>
-      <mc:AlternateContent xmlns:mc="http://schemas.openxmlformats.org/markup-compatibility/2006" xmlns:a14="http://schemas.microsoft.com/office/drawing/2010/main">
-        <mc:Choice Requires="a14">
+      <mc:AlternateContent xmlns:mc="http://schemas.openxmlformats.org/markup-compatibility/2006">
+        <mc:Choice xmlns:a14="http://schemas.microsoft.com/office/drawing/2010/main" Requires="a14">
           <p:sp>
             <p:nvSpPr>
               <p:cNvPr id="3" name="Content Placeholder 2">
@@ -42036,10 +42036,15 @@
                 <p:ph idx="1"/>
               </p:nvPr>
             </p:nvSpPr>
-            <p:spPr/>
+            <p:spPr>
+              <a:xfrm>
+                <a:off x="380010" y="1481446"/>
+                <a:ext cx="8383980" cy="4882266"/>
+              </a:xfrm>
+            </p:spPr>
             <p:txBody>
               <a:bodyPr>
-                <a:normAutofit fontScale="70000" lnSpcReduction="20000"/>
+                <a:normAutofit fontScale="77500" lnSpcReduction="20000"/>
               </a:bodyPr>
               <a:lstStyle/>
               <a:p>
@@ -42107,6 +42112,32 @@
               <a:p>
                 <a:r>
                   <a:rPr lang="en-US" dirty="0"/>
+                  <a:t>O(log n)</a:t>
+                </a:r>
+              </a:p>
+              <a:p>
+                <a:pPr lvl="1"/>
+                <a:r>
+                  <a:rPr lang="en-US" dirty="0"/>
+                  <a:t>Search through a sorted array using binary search</a:t>
+                </a:r>
+              </a:p>
+              <a:p>
+                <a:r>
+                  <a:rPr lang="en-US" dirty="0"/>
+                  <a:t>O(n log n)</a:t>
+                </a:r>
+              </a:p>
+              <a:p>
+                <a:pPr lvl="1"/>
+                <a:r>
+                  <a:rPr lang="en-US" dirty="0"/>
+                  <a:t>Merge sort</a:t>
+                </a:r>
+              </a:p>
+              <a:p>
+                <a:r>
+                  <a:rPr lang="en-US" dirty="0"/>
                   <a:t>O</a:t>
                 </a:r>
                 <a14:m>
@@ -42165,36 +42196,10 @@
                   <a:t>Quick sort</a:t>
                 </a:r>
               </a:p>
-              <a:p>
-                <a:r>
-                  <a:rPr lang="en-US" dirty="0"/>
-                  <a:t>O(log n)</a:t>
-                </a:r>
-              </a:p>
-              <a:p>
-                <a:pPr lvl="1"/>
-                <a:r>
-                  <a:rPr lang="en-US" dirty="0"/>
-                  <a:t>Search through a sorted array using binary search</a:t>
-                </a:r>
-              </a:p>
-              <a:p>
-                <a:r>
-                  <a:rPr lang="en-US" dirty="0"/>
-                  <a:t>O(n log n)</a:t>
-                </a:r>
-              </a:p>
-              <a:p>
-                <a:pPr lvl="1"/>
-                <a:r>
-                  <a:rPr lang="en-US" dirty="0"/>
-                  <a:t>Merge sort</a:t>
-                </a:r>
-              </a:p>
             </p:txBody>
           </p:sp>
         </mc:Choice>
-        <mc:Fallback xmlns="">
+        <mc:Fallback>
           <p:sp>
             <p:nvSpPr>
               <p:cNvPr id="3" name="Content Placeholder 2">
@@ -42212,10 +42217,14 @@
               </p:nvPr>
             </p:nvSpPr>
             <p:spPr>
+              <a:xfrm>
+                <a:off x="380010" y="1481446"/>
+                <a:ext cx="8383980" cy="4882266"/>
+              </a:xfrm>
               <a:blipFill>
                 <a:blip r:embed="rId2"/>
                 <a:stretch>
-                  <a:fillRect l="-654" t="-1887"/>
+                  <a:fillRect l="-799" t="-2122" r="-1017" b="-1498"/>
                 </a:stretch>
               </a:blipFill>
             </p:spPr>
@@ -42743,19 +42752,33 @@
         </p:spPr>
         <p:txBody>
           <a:bodyPr>
-            <a:normAutofit/>
+            <a:normAutofit fontScale="92500"/>
           </a:bodyPr>
           <a:lstStyle/>
           <a:p>
             <a:r>
               <a:rPr lang="en-US" dirty="0"/>
-              <a:t>An algorithm is just a step-by-step approach to solving a problem.</a:t>
+              <a:t>‘Algorithm’ is often a buzzword, but its just a step-by-step approach to solving a problem.</a:t>
+            </a:r>
+          </a:p>
+          <a:p>
+            <a:pPr lvl="1"/>
+            <a:r>
+              <a:rPr lang="en-US" dirty="0"/>
+              <a:t>Following directions to bake a cake</a:t>
+            </a:r>
+          </a:p>
+          <a:p>
+            <a:pPr lvl="1"/>
+            <a:r>
+              <a:rPr lang="en-US" dirty="0"/>
+              <a:t>Giving directions to get to your house</a:t>
             </a:r>
           </a:p>
           <a:p>
             <a:r>
               <a:rPr lang="en-US" dirty="0"/>
-              <a:t>You have an array of numbers, and you want to sort them from lowest to highest. How do you do it?</a:t>
+              <a:t>If you have an array of numbers, and you want to sort them from lowest to highest. How do you do it?</a:t>
             </a:r>
           </a:p>
           <a:p>
@@ -43435,7 +43458,7 @@
             </a:pPr>
             <a:r>
               <a:rPr lang="en-US" sz="1600" dirty="0"/>
-              <a:t>(could still be better)</a:t>
+              <a:t>(even now could still be improved)</a:t>
             </a:r>
           </a:p>
         </p:txBody>

</xml_diff>